<commit_message>
updated materials for Day 4
</commit_message>
<xml_diff>
--- a/Day 2/JavaScript/Slides/3. JavaScript Beginnings/javascript-beginnings-slides.pptx
+++ b/Day 2/JavaScript/Slides/3. JavaScript Beginnings/javascript-beginnings-slides.pptx
@@ -5,24 +5,24 @@
     <p:sldMasterId id="2147483648" r:id="rId1"/>
   </p:sldMasterIdLst>
   <p:notesMasterIdLst>
-    <p:notesMasterId r:id="rId18"/>
+    <p:notesMasterId r:id="rId17"/>
   </p:notesMasterIdLst>
   <p:sldIdLst>
-    <p:sldId id="256" r:id="rId3"/>
-    <p:sldId id="257" r:id="rId4"/>
-    <p:sldId id="258" r:id="rId5"/>
-    <p:sldId id="259" r:id="rId6"/>
-    <p:sldId id="260" r:id="rId7"/>
-    <p:sldId id="261" r:id="rId8"/>
-    <p:sldId id="262" r:id="rId9"/>
-    <p:sldId id="263" r:id="rId10"/>
-    <p:sldId id="264" r:id="rId11"/>
-    <p:sldId id="265" r:id="rId12"/>
-    <p:sldId id="266" r:id="rId13"/>
-    <p:sldId id="267" r:id="rId14"/>
-    <p:sldId id="268" r:id="rId15"/>
-    <p:sldId id="269" r:id="rId16"/>
-    <p:sldId id="270" r:id="rId17"/>
+    <p:sldId id="256" r:id="rId2"/>
+    <p:sldId id="257" r:id="rId3"/>
+    <p:sldId id="258" r:id="rId4"/>
+    <p:sldId id="259" r:id="rId5"/>
+    <p:sldId id="260" r:id="rId6"/>
+    <p:sldId id="261" r:id="rId7"/>
+    <p:sldId id="262" r:id="rId8"/>
+    <p:sldId id="263" r:id="rId9"/>
+    <p:sldId id="264" r:id="rId10"/>
+    <p:sldId id="265" r:id="rId11"/>
+    <p:sldId id="266" r:id="rId12"/>
+    <p:sldId id="267" r:id="rId13"/>
+    <p:sldId id="268" r:id="rId14"/>
+    <p:sldId id="269" r:id="rId15"/>
+    <p:sldId id="270" r:id="rId16"/>
   </p:sldIdLst>
   <p:sldSz cx="12192000" cy="6858000"/>
   <p:notesSz cx="12192000" cy="6858000"/>
@@ -118,6 +118,22 @@
       </a:defRPr>
     </a:lvl9pPr>
   </p:defaultTextStyle>
+  <p:extLst>
+    <p:ext uri="{EFAFB233-063F-42B5-8137-9DF3F51BA10A}">
+      <p15:sldGuideLst xmlns:p15="http://schemas.microsoft.com/office/powerpoint/2012/main">
+        <p15:guide id="1" orient="horz" pos="2880">
+          <p15:clr>
+            <a:srgbClr val="A4A3A4"/>
+          </p15:clr>
+        </p15:guide>
+        <p15:guide id="2" pos="2160">
+          <p15:clr>
+            <a:srgbClr val="A4A3A4"/>
+          </p15:clr>
+        </p15:guide>
+      </p15:sldGuideLst>
+    </p:ext>
+  </p:extLst>
 </p:presentation>
 </file>
 
@@ -203,6 +219,7 @@
           <a:p>
             <a:fld id="{3EFD42F7-718C-4B98-AAEC-167E6DDD60A7}" type="datetimeFigureOut">
               <a:rPr lang="en-US" smtClean="0"/>
+              <a:t>8/1/2023</a:t>
             </a:fld>
             <a:endParaRPr lang="en-US"/>
           </a:p>
@@ -266,42 +283,37 @@
           <a:p>
             <a:pPr lvl="0"/>
             <a:r>
-              <a:rPr lang="en-US" smtClean="0"/>
+              <a:rPr lang="en-US"/>
               <a:t>Click to edit Master text styles</a:t>
             </a:r>
-            <a:endParaRPr lang="en-US" smtClean="0"/>
           </a:p>
           <a:p>
             <a:pPr lvl="1"/>
             <a:r>
-              <a:rPr lang="en-US" smtClean="0"/>
+              <a:rPr lang="en-US"/>
               <a:t>Second level</a:t>
             </a:r>
-            <a:endParaRPr lang="en-US" smtClean="0"/>
           </a:p>
           <a:p>
             <a:pPr lvl="2"/>
             <a:r>
-              <a:rPr lang="en-US" smtClean="0"/>
+              <a:rPr lang="en-US"/>
               <a:t>Third level</a:t>
             </a:r>
-            <a:endParaRPr lang="en-US" smtClean="0"/>
           </a:p>
           <a:p>
             <a:pPr lvl="3"/>
             <a:r>
-              <a:rPr lang="en-US" smtClean="0"/>
+              <a:rPr lang="en-US"/>
               <a:t>Fourth level</a:t>
             </a:r>
-            <a:endParaRPr lang="en-US" smtClean="0"/>
           </a:p>
           <a:p>
             <a:pPr lvl="4"/>
             <a:r>
-              <a:rPr lang="en-US" smtClean="0"/>
+              <a:rPr lang="en-US"/>
               <a:t>Fifth level</a:t>
             </a:r>
-            <a:endParaRPr lang="en-US"/>
           </a:p>
         </p:txBody>
       </p:sp>
@@ -365,6 +377,7 @@
           <a:p>
             <a:fld id="{21B2AA4F-B828-4D7C-AFD3-893933DAFCB4}" type="slidenum">
               <a:rPr lang="en-US" smtClean="0"/>
+              <a:t>‹#›</a:t>
             </a:fld>
             <a:endParaRPr lang="en-US"/>
           </a:p>
@@ -513,7 +526,9 @@
               <a:defRPr/>
             </a:lvl1pPr>
           </a:lstStyle>
-          <a:p/>
+          <a:p>
+            <a:endParaRPr/>
+          </a:p>
         </p:txBody>
       </p:sp>
       <p:sp>
@@ -544,7 +559,9 @@
               <a:defRPr/>
             </a:lvl1pPr>
           </a:lstStyle>
-          <a:p/>
+          <a:p>
+            <a:endParaRPr/>
+          </a:p>
         </p:txBody>
       </p:sp>
       <p:sp>
@@ -571,7 +588,9 @@
               </a:defRPr>
             </a:lvl1pPr>
           </a:lstStyle>
-          <a:p/>
+          <a:p>
+            <a:endParaRPr/>
+          </a:p>
         </p:txBody>
       </p:sp>
       <p:sp>
@@ -601,6 +620,7 @@
           <a:p>
             <a:fld id="{1D8BD707-D9CF-40AE-B4C6-C98DA3205C09}" type="datetimeFigureOut">
               <a:rPr lang="en-US"/>
+              <a:t>8/1/2023</a:t>
             </a:fld>
             <a:endParaRPr lang="en-US"/>
           </a:p>
@@ -633,6 +653,7 @@
           <a:p>
             <a:fld id="{B6F15528-21DE-4FAA-801E-634DDDAF4B2B}" type="slidenum">
               <a:rPr/>
+              <a:t>‹#›</a:t>
             </a:fld>
             <a:endParaRPr/>
           </a:p>
@@ -648,7 +669,7 @@
 </file>
 
 <file path=ppt/slideLayouts/slideLayout2.xml><?xml version="1.0" encoding="utf-8"?>
-<p:sldLayout xmlns:a="http://schemas.openxmlformats.org/drawingml/2006/main" xmlns:r="http://schemas.openxmlformats.org/officeDocument/2006/relationships" xmlns:p="http://schemas.openxmlformats.org/presentationml/2006/main" type="obj" preserve="1" showMasterSp="0">
+<p:sldLayout xmlns:a="http://schemas.openxmlformats.org/drawingml/2006/main" xmlns:r="http://schemas.openxmlformats.org/officeDocument/2006/relationships" xmlns:p="http://schemas.openxmlformats.org/presentationml/2006/main" showMasterSp="0" type="obj" preserve="1">
   <p:cSld name="Title and Content">
     <p:bg>
       <p:bgPr>
@@ -717,7 +738,9 @@
         <p:txBody>
           <a:bodyPr wrap="square" lIns="0" tIns="0" rIns="0" bIns="0" rtlCol="0"/>
           <a:lstStyle/>
-          <a:p/>
+          <a:p>
+            <a:endParaRPr/>
+          </a:p>
         </p:txBody>
       </p:sp>
       <p:sp>
@@ -744,7 +767,9 @@
               </a:defRPr>
             </a:lvl1pPr>
           </a:lstStyle>
-          <a:p/>
+          <a:p>
+            <a:endParaRPr/>
+          </a:p>
         </p:txBody>
       </p:sp>
       <p:sp>
@@ -769,7 +794,9 @@
               </a:defRPr>
             </a:lvl1pPr>
           </a:lstStyle>
-          <a:p/>
+          <a:p>
+            <a:endParaRPr/>
+          </a:p>
         </p:txBody>
       </p:sp>
       <p:sp>
@@ -796,7 +823,9 @@
               </a:defRPr>
             </a:lvl1pPr>
           </a:lstStyle>
-          <a:p/>
+          <a:p>
+            <a:endParaRPr/>
+          </a:p>
         </p:txBody>
       </p:sp>
       <p:sp>
@@ -826,6 +855,7 @@
           <a:p>
             <a:fld id="{1D8BD707-D9CF-40AE-B4C6-C98DA3205C09}" type="datetimeFigureOut">
               <a:rPr lang="en-US"/>
+              <a:t>8/1/2023</a:t>
             </a:fld>
             <a:endParaRPr lang="en-US"/>
           </a:p>
@@ -858,6 +888,7 @@
           <a:p>
             <a:fld id="{B6F15528-21DE-4FAA-801E-634DDDAF4B2B}" type="slidenum">
               <a:rPr/>
+              <a:t>‹#›</a:t>
             </a:fld>
             <a:endParaRPr/>
           </a:p>
@@ -913,7 +944,9 @@
               </a:defRPr>
             </a:lvl1pPr>
           </a:lstStyle>
-          <a:p/>
+          <a:p>
+            <a:endParaRPr/>
+          </a:p>
         </p:txBody>
       </p:sp>
       <p:sp>
@@ -944,7 +977,9 @@
               <a:defRPr/>
             </a:lvl1pPr>
           </a:lstStyle>
-          <a:p/>
+          <a:p>
+            <a:endParaRPr/>
+          </a:p>
         </p:txBody>
       </p:sp>
       <p:sp>
@@ -975,7 +1010,9 @@
               <a:defRPr/>
             </a:lvl1pPr>
           </a:lstStyle>
-          <a:p/>
+          <a:p>
+            <a:endParaRPr/>
+          </a:p>
         </p:txBody>
       </p:sp>
       <p:sp>
@@ -1002,7 +1039,9 @@
               </a:defRPr>
             </a:lvl1pPr>
           </a:lstStyle>
-          <a:p/>
+          <a:p>
+            <a:endParaRPr/>
+          </a:p>
         </p:txBody>
       </p:sp>
       <p:sp>
@@ -1032,6 +1071,7 @@
           <a:p>
             <a:fld id="{1D8BD707-D9CF-40AE-B4C6-C98DA3205C09}" type="datetimeFigureOut">
               <a:rPr lang="en-US"/>
+              <a:t>8/1/2023</a:t>
             </a:fld>
             <a:endParaRPr lang="en-US"/>
           </a:p>
@@ -1064,6 +1104,7 @@
           <a:p>
             <a:fld id="{B6F15528-21DE-4FAA-801E-634DDDAF4B2B}" type="slidenum">
               <a:rPr/>
+              <a:t>‹#›</a:t>
             </a:fld>
             <a:endParaRPr/>
           </a:p>
@@ -1079,7 +1120,7 @@
 </file>
 
 <file path=ppt/slideLayouts/slideLayout4.xml><?xml version="1.0" encoding="utf-8"?>
-<p:sldLayout xmlns:a="http://schemas.openxmlformats.org/drawingml/2006/main" xmlns:r="http://schemas.openxmlformats.org/officeDocument/2006/relationships" xmlns:p="http://schemas.openxmlformats.org/presentationml/2006/main" type="obj" preserve="1" showMasterSp="0">
+<p:sldLayout xmlns:a="http://schemas.openxmlformats.org/drawingml/2006/main" xmlns:r="http://schemas.openxmlformats.org/officeDocument/2006/relationships" xmlns:p="http://schemas.openxmlformats.org/presentationml/2006/main" showMasterSp="0" type="obj" preserve="1">
   <p:cSld name="Title Only">
     <p:bg>
       <p:bgPr>
@@ -1148,7 +1189,9 @@
         <p:txBody>
           <a:bodyPr wrap="square" lIns="0" tIns="0" rIns="0" bIns="0" rtlCol="0"/>
           <a:lstStyle/>
-          <a:p/>
+          <a:p>
+            <a:endParaRPr/>
+          </a:p>
         </p:txBody>
       </p:sp>
       <p:sp>
@@ -1175,7 +1218,9 @@
               </a:defRPr>
             </a:lvl1pPr>
           </a:lstStyle>
-          <a:p/>
+          <a:p>
+            <a:endParaRPr/>
+          </a:p>
         </p:txBody>
       </p:sp>
       <p:sp>
@@ -1202,7 +1247,9 @@
               </a:defRPr>
             </a:lvl1pPr>
           </a:lstStyle>
-          <a:p/>
+          <a:p>
+            <a:endParaRPr/>
+          </a:p>
         </p:txBody>
       </p:sp>
       <p:sp>
@@ -1232,6 +1279,7 @@
           <a:p>
             <a:fld id="{1D8BD707-D9CF-40AE-B4C6-C98DA3205C09}" type="datetimeFigureOut">
               <a:rPr lang="en-US"/>
+              <a:t>8/1/2023</a:t>
             </a:fld>
             <a:endParaRPr lang="en-US"/>
           </a:p>
@@ -1264,6 +1312,7 @@
           <a:p>
             <a:fld id="{B6F15528-21DE-4FAA-801E-634DDDAF4B2B}" type="slidenum">
               <a:rPr/>
+              <a:t>‹#›</a:t>
             </a:fld>
             <a:endParaRPr/>
           </a:p>
@@ -1319,7 +1368,9 @@
               </a:defRPr>
             </a:lvl1pPr>
           </a:lstStyle>
-          <a:p/>
+          <a:p>
+            <a:endParaRPr/>
+          </a:p>
         </p:txBody>
       </p:sp>
       <p:sp>
@@ -1349,6 +1400,7 @@
           <a:p>
             <a:fld id="{1D8BD707-D9CF-40AE-B4C6-C98DA3205C09}" type="datetimeFigureOut">
               <a:rPr lang="en-US"/>
+              <a:t>8/1/2023</a:t>
             </a:fld>
             <a:endParaRPr lang="en-US"/>
           </a:p>
@@ -1381,6 +1433,7 @@
           <a:p>
             <a:fld id="{B6F15528-21DE-4FAA-801E-634DDDAF4B2B}" type="slidenum">
               <a:rPr/>
+              <a:t>‹#›</a:t>
             </a:fld>
             <a:endParaRPr/>
           </a:p>
@@ -1454,7 +1507,9 @@
               </a:defRPr>
             </a:lvl1pPr>
           </a:lstStyle>
-          <a:p/>
+          <a:p>
+            <a:endParaRPr/>
+          </a:p>
         </p:txBody>
       </p:sp>
       <p:sp>
@@ -1489,7 +1544,9 @@
               </a:defRPr>
             </a:lvl1pPr>
           </a:lstStyle>
-          <a:p/>
+          <a:p>
+            <a:endParaRPr/>
+          </a:p>
         </p:txBody>
       </p:sp>
       <p:sp>
@@ -1526,7 +1583,9 @@
               </a:defRPr>
             </a:lvl1pPr>
           </a:lstStyle>
-          <a:p/>
+          <a:p>
+            <a:endParaRPr/>
+          </a:p>
         </p:txBody>
       </p:sp>
       <p:sp>
@@ -1566,6 +1625,7 @@
           <a:p>
             <a:fld id="{1D8BD707-D9CF-40AE-B4C6-C98DA3205C09}" type="datetimeFigureOut">
               <a:rPr lang="en-US"/>
+              <a:t>8/1/2023</a:t>
             </a:fld>
             <a:endParaRPr lang="en-US"/>
           </a:p>
@@ -1608,6 +1668,7 @@
           <a:p>
             <a:fld id="{B6F15528-21DE-4FAA-801E-634DDDAF4B2B}" type="slidenum">
               <a:rPr/>
+              <a:t>‹#›</a:t>
             </a:fld>
             <a:endParaRPr/>
           </a:p>
@@ -1792,7 +1853,7 @@
           <p:nvPr/>
         </p:nvPicPr>
         <p:blipFill>
-          <a:blip r:embed="rId1" cstate="print"/>
+          <a:blip r:embed="rId2" cstate="print"/>
           <a:stretch>
             <a:fillRect/>
           </a:stretch>
@@ -1814,7 +1875,7 @@
           <p:nvPr/>
         </p:nvPicPr>
         <p:blipFill>
-          <a:blip r:embed="rId2" cstate="print"/>
+          <a:blip r:embed="rId3" cstate="print"/>
           <a:stretch>
             <a:fillRect/>
           </a:stretch>
@@ -1842,9 +1903,11 @@
         <p:spPr/>
         <p:txBody>
           <a:bodyPr/>
+          <a:lstStyle/>
           <a:p>
             <a:fld id="{B6F15528-21DE-4FAA-801E-634DDDAF4B2B}" type="slidenum">
               <a:rPr/>
+              <a:t>1</a:t>
             </a:fld>
             <a:endParaRPr/>
           </a:p>
@@ -1882,7 +1945,7 @@
           <p:nvPr/>
         </p:nvPicPr>
         <p:blipFill>
-          <a:blip r:embed="rId1" cstate="print"/>
+          <a:blip r:embed="rId2" cstate="print"/>
           <a:stretch>
             <a:fillRect/>
           </a:stretch>
@@ -1904,7 +1967,7 @@
           <p:nvPr/>
         </p:nvPicPr>
         <p:blipFill>
-          <a:blip r:embed="rId2" cstate="print"/>
+          <a:blip r:embed="rId3" cstate="print"/>
           <a:stretch>
             <a:fillRect/>
           </a:stretch>
@@ -1932,9 +1995,11 @@
         <p:spPr/>
         <p:txBody>
           <a:bodyPr/>
+          <a:lstStyle/>
           <a:p>
             <a:fld id="{B6F15528-21DE-4FAA-801E-634DDDAF4B2B}" type="slidenum">
               <a:rPr/>
+              <a:t>10</a:t>
             </a:fld>
             <a:endParaRPr/>
           </a:p>
@@ -1972,7 +2037,7 @@
           <p:nvPr/>
         </p:nvPicPr>
         <p:blipFill>
-          <a:blip r:embed="rId1" cstate="print"/>
+          <a:blip r:embed="rId2" cstate="print"/>
           <a:stretch>
             <a:fillRect/>
           </a:stretch>
@@ -1994,7 +2059,7 @@
           <p:nvPr/>
         </p:nvPicPr>
         <p:blipFill>
-          <a:blip r:embed="rId2" cstate="print"/>
+          <a:blip r:embed="rId3" cstate="print"/>
           <a:stretch>
             <a:fillRect/>
           </a:stretch>
@@ -2022,9 +2087,11 @@
         <p:spPr/>
         <p:txBody>
           <a:bodyPr/>
+          <a:lstStyle/>
           <a:p>
             <a:fld id="{B6F15528-21DE-4FAA-801E-634DDDAF4B2B}" type="slidenum">
               <a:rPr/>
+              <a:t>11</a:t>
             </a:fld>
             <a:endParaRPr/>
           </a:p>
@@ -2062,7 +2129,7 @@
           <p:nvPr/>
         </p:nvPicPr>
         <p:blipFill>
-          <a:blip r:embed="rId1" cstate="print"/>
+          <a:blip r:embed="rId2" cstate="print"/>
           <a:stretch>
             <a:fillRect/>
           </a:stretch>
@@ -2084,7 +2151,7 @@
           <p:nvPr/>
         </p:nvPicPr>
         <p:blipFill>
-          <a:blip r:embed="rId2" cstate="print"/>
+          <a:blip r:embed="rId3" cstate="print"/>
           <a:stretch>
             <a:fillRect/>
           </a:stretch>
@@ -2112,9 +2179,11 @@
         <p:spPr/>
         <p:txBody>
           <a:bodyPr/>
+          <a:lstStyle/>
           <a:p>
             <a:fld id="{B6F15528-21DE-4FAA-801E-634DDDAF4B2B}" type="slidenum">
               <a:rPr/>
+              <a:t>12</a:t>
             </a:fld>
             <a:endParaRPr/>
           </a:p>
@@ -2206,7 +2275,6 @@
               <a:rPr spc="-5" dirty="0"/>
               <a:t>comment</a:t>
             </a:r>
-            <a:endParaRPr spc="-5" dirty="0"/>
           </a:p>
         </p:txBody>
       </p:sp>
@@ -2217,7 +2285,7 @@
           <p:nvPr/>
         </p:nvPicPr>
         <p:blipFill>
-          <a:blip r:embed="rId1" cstate="print"/>
+          <a:blip r:embed="rId2" cstate="print"/>
           <a:stretch>
             <a:fillRect/>
           </a:stretch>
@@ -2245,9 +2313,11 @@
         <p:spPr/>
         <p:txBody>
           <a:bodyPr/>
+          <a:lstStyle/>
           <a:p>
             <a:fld id="{B6F15528-21DE-4FAA-801E-634DDDAF4B2B}" type="slidenum">
               <a:rPr/>
+              <a:t>13</a:t>
             </a:fld>
             <a:endParaRPr/>
           </a:p>
@@ -2339,7 +2409,6 @@
               <a:rPr spc="-5" dirty="0"/>
               <a:t>comment</a:t>
             </a:r>
-            <a:endParaRPr spc="-5" dirty="0"/>
           </a:p>
         </p:txBody>
       </p:sp>
@@ -2628,7 +2697,7 @@
           <p:nvPr/>
         </p:nvPicPr>
         <p:blipFill>
-          <a:blip r:embed="rId1" cstate="print"/>
+          <a:blip r:embed="rId2" cstate="print"/>
           <a:stretch>
             <a:fillRect/>
           </a:stretch>
@@ -2656,9 +2725,11 @@
         <p:spPr/>
         <p:txBody>
           <a:bodyPr/>
+          <a:lstStyle/>
           <a:p>
             <a:fld id="{B6F15528-21DE-4FAA-801E-634DDDAF4B2B}" type="slidenum">
               <a:rPr/>
+              <a:t>14</a:t>
             </a:fld>
             <a:endParaRPr/>
           </a:p>
@@ -2696,28 +2767,6 @@
           <p:nvPr/>
         </p:nvPicPr>
         <p:blipFill>
-          <a:blip r:embed="rId1" cstate="print"/>
-          <a:stretch>
-            <a:fillRect/>
-          </a:stretch>
-        </p:blipFill>
-        <p:spPr>
-          <a:xfrm>
-            <a:off x="0" y="0"/>
-            <a:ext cx="4635246" cy="6858000"/>
-          </a:xfrm>
-          <a:prstGeom prst="rect">
-            <a:avLst/>
-          </a:prstGeom>
-        </p:spPr>
-      </p:pic>
-      <p:pic>
-        <p:nvPicPr>
-          <p:cNvPr id="3" name="object 3"/>
-          <p:cNvPicPr/>
-          <p:nvPr/>
-        </p:nvPicPr>
-        <p:blipFill>
           <a:blip r:embed="rId2" cstate="print"/>
           <a:stretch>
             <a:fillRect/>
@@ -2725,87 +2774,17 @@
         </p:blipFill>
         <p:spPr>
           <a:xfrm>
-            <a:off x="5239003" y="626109"/>
-            <a:ext cx="3383915" cy="365760"/>
+            <a:off x="0" y="0"/>
+            <a:ext cx="4635246" cy="6858000"/>
           </a:xfrm>
           <a:prstGeom prst="rect">
             <a:avLst/>
           </a:prstGeom>
         </p:spPr>
       </p:pic>
-      <p:sp>
-        <p:nvSpPr>
-          <p:cNvPr id="4" name="object 4"/>
-          <p:cNvSpPr txBox="1"/>
-          <p:nvPr/>
-        </p:nvSpPr>
-        <p:spPr>
-          <a:xfrm>
-            <a:off x="5466588" y="1119378"/>
-            <a:ext cx="116839" cy="741680"/>
-          </a:xfrm>
-          <a:prstGeom prst="rect">
-            <a:avLst/>
-          </a:prstGeom>
-        </p:spPr>
-        <p:txBody>
-          <a:bodyPr vert="horz" wrap="square" lIns="0" tIns="12700" rIns="0" bIns="0" rtlCol="0">
-            <a:spAutoFit/>
-          </a:bodyPr>
-          <a:lstStyle/>
-          <a:p>
-            <a:pPr marL="12700">
-              <a:lnSpc>
-                <a:spcPct val="100000"/>
-              </a:lnSpc>
-              <a:spcBef>
-                <a:spcPts val="100"/>
-              </a:spcBef>
-            </a:pPr>
-            <a:r>
-              <a:rPr sz="1800" dirty="0">
-                <a:solidFill>
-                  <a:srgbClr val="EF5A28"/>
-                </a:solidFill>
-                <a:latin typeface="Segoe UI" panose="020B0502040204020203"/>
-                <a:cs typeface="Segoe UI" panose="020B0502040204020203"/>
-              </a:rPr>
-              <a:t>-</a:t>
-            </a:r>
-            <a:endParaRPr sz="1800">
-              <a:latin typeface="Segoe UI" panose="020B0502040204020203"/>
-              <a:cs typeface="Segoe UI" panose="020B0502040204020203"/>
-            </a:endParaRPr>
-          </a:p>
-          <a:p>
-            <a:pPr marL="12700">
-              <a:lnSpc>
-                <a:spcPct val="100000"/>
-              </a:lnSpc>
-              <a:spcBef>
-                <a:spcPts val="1320"/>
-              </a:spcBef>
-            </a:pPr>
-            <a:r>
-              <a:rPr sz="1800" dirty="0">
-                <a:solidFill>
-                  <a:srgbClr val="EF5A28"/>
-                </a:solidFill>
-                <a:latin typeface="Segoe UI" panose="020B0502040204020203"/>
-                <a:cs typeface="Segoe UI" panose="020B0502040204020203"/>
-              </a:rPr>
-              <a:t>-</a:t>
-            </a:r>
-            <a:endParaRPr sz="1800">
-              <a:latin typeface="Segoe UI" panose="020B0502040204020203"/>
-              <a:cs typeface="Segoe UI" panose="020B0502040204020203"/>
-            </a:endParaRPr>
-          </a:p>
-        </p:txBody>
-      </p:sp>
       <p:pic>
         <p:nvPicPr>
-          <p:cNvPr id="5" name="object 5"/>
+          <p:cNvPr id="3" name="object 3"/>
           <p:cNvPicPr/>
           <p:nvPr/>
         </p:nvPicPr>
@@ -2817,6 +2796,98 @@
         </p:blipFill>
         <p:spPr>
           <a:xfrm>
+            <a:off x="5239003" y="626109"/>
+            <a:ext cx="3383915" cy="365760"/>
+          </a:xfrm>
+          <a:prstGeom prst="rect">
+            <a:avLst/>
+          </a:prstGeom>
+        </p:spPr>
+      </p:pic>
+      <p:sp>
+        <p:nvSpPr>
+          <p:cNvPr id="4" name="object 4"/>
+          <p:cNvSpPr txBox="1"/>
+          <p:nvPr/>
+        </p:nvSpPr>
+        <p:spPr>
+          <a:xfrm>
+            <a:off x="5466588" y="1119378"/>
+            <a:ext cx="116839" cy="741680"/>
+          </a:xfrm>
+          <a:prstGeom prst="rect">
+            <a:avLst/>
+          </a:prstGeom>
+        </p:spPr>
+        <p:txBody>
+          <a:bodyPr vert="horz" wrap="square" lIns="0" tIns="12700" rIns="0" bIns="0" rtlCol="0">
+            <a:spAutoFit/>
+          </a:bodyPr>
+          <a:lstStyle/>
+          <a:p>
+            <a:pPr marL="12700">
+              <a:lnSpc>
+                <a:spcPct val="100000"/>
+              </a:lnSpc>
+              <a:spcBef>
+                <a:spcPts val="100"/>
+              </a:spcBef>
+            </a:pPr>
+            <a:r>
+              <a:rPr sz="1800" dirty="0">
+                <a:solidFill>
+                  <a:srgbClr val="EF5A28"/>
+                </a:solidFill>
+                <a:latin typeface="Segoe UI" panose="020B0502040204020203"/>
+                <a:cs typeface="Segoe UI" panose="020B0502040204020203"/>
+              </a:rPr>
+              <a:t>-</a:t>
+            </a:r>
+            <a:endParaRPr sz="1800">
+              <a:latin typeface="Segoe UI" panose="020B0502040204020203"/>
+              <a:cs typeface="Segoe UI" panose="020B0502040204020203"/>
+            </a:endParaRPr>
+          </a:p>
+          <a:p>
+            <a:pPr marL="12700">
+              <a:lnSpc>
+                <a:spcPct val="100000"/>
+              </a:lnSpc>
+              <a:spcBef>
+                <a:spcPts val="1320"/>
+              </a:spcBef>
+            </a:pPr>
+            <a:r>
+              <a:rPr sz="1800" dirty="0">
+                <a:solidFill>
+                  <a:srgbClr val="EF5A28"/>
+                </a:solidFill>
+                <a:latin typeface="Segoe UI" panose="020B0502040204020203"/>
+                <a:cs typeface="Segoe UI" panose="020B0502040204020203"/>
+              </a:rPr>
+              <a:t>-</a:t>
+            </a:r>
+            <a:endParaRPr sz="1800">
+              <a:latin typeface="Segoe UI" panose="020B0502040204020203"/>
+              <a:cs typeface="Segoe UI" panose="020B0502040204020203"/>
+            </a:endParaRPr>
+          </a:p>
+        </p:txBody>
+      </p:sp>
+      <p:pic>
+        <p:nvPicPr>
+          <p:cNvPr id="5" name="object 5"/>
+          <p:cNvPicPr/>
+          <p:nvPr/>
+        </p:nvPicPr>
+        <p:blipFill>
+          <a:blip r:embed="rId4" cstate="print"/>
+          <a:stretch>
+            <a:fillRect/>
+          </a:stretch>
+        </p:blipFill>
+        <p:spPr>
+          <a:xfrm>
             <a:off x="5768085" y="1068069"/>
             <a:ext cx="2932557" cy="365760"/>
           </a:xfrm>
@@ -2846,7 +2917,7 @@
             <p:nvPr/>
           </p:nvPicPr>
           <p:blipFill>
-            <a:blip r:embed="rId4" cstate="print"/>
+            <a:blip r:embed="rId5" cstate="print"/>
             <a:stretch>
               <a:fillRect/>
             </a:stretch>
@@ -2868,7 +2939,7 @@
             <p:nvPr/>
           </p:nvPicPr>
           <p:blipFill>
-            <a:blip r:embed="rId5" cstate="print"/>
+            <a:blip r:embed="rId6" cstate="print"/>
             <a:stretch>
               <a:fillRect/>
             </a:stretch>
@@ -2890,7 +2961,7 @@
             <p:nvPr/>
           </p:nvPicPr>
           <p:blipFill>
-            <a:blip r:embed="rId6" cstate="print"/>
+            <a:blip r:embed="rId7" cstate="print"/>
             <a:stretch>
               <a:fillRect/>
             </a:stretch>
@@ -2913,7 +2984,7 @@
           <p:nvPr/>
         </p:nvPicPr>
         <p:blipFill>
-          <a:blip r:embed="rId7" cstate="print"/>
+          <a:blip r:embed="rId8" cstate="print"/>
           <a:stretch>
             <a:fillRect/>
           </a:stretch>
@@ -2977,28 +3048,6 @@
       <p:pic>
         <p:nvPicPr>
           <p:cNvPr id="12" name="object 12"/>
-          <p:cNvPicPr/>
-          <p:nvPr/>
-        </p:nvPicPr>
-        <p:blipFill>
-          <a:blip r:embed="rId8" cstate="print"/>
-          <a:stretch>
-            <a:fillRect/>
-          </a:stretch>
-        </p:blipFill>
-        <p:spPr>
-          <a:xfrm>
-            <a:off x="5768085" y="2546095"/>
-            <a:ext cx="3512692" cy="366013"/>
-          </a:xfrm>
-          <a:prstGeom prst="rect">
-            <a:avLst/>
-          </a:prstGeom>
-        </p:spPr>
-      </p:pic>
-      <p:pic>
-        <p:nvPicPr>
-          <p:cNvPr id="13" name="object 13"/>
           <p:cNvPicPr/>
           <p:nvPr/>
         </p:nvPicPr>
@@ -3010,8 +3059,8 @@
         </p:blipFill>
         <p:spPr>
           <a:xfrm>
-            <a:off x="5239003" y="3140964"/>
-            <a:ext cx="2687447" cy="365760"/>
+            <a:off x="5768085" y="2546095"/>
+            <a:ext cx="3512692" cy="366013"/>
           </a:xfrm>
           <a:prstGeom prst="rect">
             <a:avLst/>
@@ -3020,7 +3069,7 @@
       </p:pic>
       <p:pic>
         <p:nvPicPr>
-          <p:cNvPr id="14" name="object 14"/>
+          <p:cNvPr id="13" name="object 13"/>
           <p:cNvPicPr/>
           <p:nvPr/>
         </p:nvPicPr>
@@ -3032,63 +3081,17 @@
         </p:blipFill>
         <p:spPr>
           <a:xfrm>
-            <a:off x="5239003" y="3735323"/>
-            <a:ext cx="2579751" cy="365760"/>
+            <a:off x="5239003" y="3140964"/>
+            <a:ext cx="2687447" cy="365760"/>
           </a:xfrm>
           <a:prstGeom prst="rect">
             <a:avLst/>
           </a:prstGeom>
         </p:spPr>
       </p:pic>
-      <p:sp>
-        <p:nvSpPr>
-          <p:cNvPr id="15" name="object 15"/>
-          <p:cNvSpPr txBox="1"/>
-          <p:nvPr/>
-        </p:nvSpPr>
-        <p:spPr>
-          <a:xfrm>
-            <a:off x="5466588" y="4228592"/>
-            <a:ext cx="116839" cy="299720"/>
-          </a:xfrm>
-          <a:prstGeom prst="rect">
-            <a:avLst/>
-          </a:prstGeom>
-        </p:spPr>
-        <p:txBody>
-          <a:bodyPr vert="horz" wrap="square" lIns="0" tIns="12700" rIns="0" bIns="0" rtlCol="0">
-            <a:spAutoFit/>
-          </a:bodyPr>
-          <a:lstStyle/>
-          <a:p>
-            <a:pPr marL="12700">
-              <a:lnSpc>
-                <a:spcPct val="100000"/>
-              </a:lnSpc>
-              <a:spcBef>
-                <a:spcPts val="100"/>
-              </a:spcBef>
-            </a:pPr>
-            <a:r>
-              <a:rPr sz="1800" dirty="0">
-                <a:solidFill>
-                  <a:srgbClr val="EF5A28"/>
-                </a:solidFill>
-                <a:latin typeface="Segoe UI" panose="020B0502040204020203"/>
-                <a:cs typeface="Segoe UI" panose="020B0502040204020203"/>
-              </a:rPr>
-              <a:t>-</a:t>
-            </a:r>
-            <a:endParaRPr sz="1800">
-              <a:latin typeface="Segoe UI" panose="020B0502040204020203"/>
-              <a:cs typeface="Segoe UI" panose="020B0502040204020203"/>
-            </a:endParaRPr>
-          </a:p>
-        </p:txBody>
-      </p:sp>
       <p:pic>
         <p:nvPicPr>
-          <p:cNvPr id="16" name="object 16"/>
+          <p:cNvPr id="14" name="object 14"/>
           <p:cNvPicPr/>
           <p:nvPr/>
         </p:nvPicPr>
@@ -3100,17 +3103,63 @@
         </p:blipFill>
         <p:spPr>
           <a:xfrm>
-            <a:off x="5768085" y="4177284"/>
-            <a:ext cx="3004439" cy="365760"/>
+            <a:off x="5239003" y="3735323"/>
+            <a:ext cx="2579751" cy="365760"/>
           </a:xfrm>
           <a:prstGeom prst="rect">
             <a:avLst/>
           </a:prstGeom>
         </p:spPr>
       </p:pic>
+      <p:sp>
+        <p:nvSpPr>
+          <p:cNvPr id="15" name="object 15"/>
+          <p:cNvSpPr txBox="1"/>
+          <p:nvPr/>
+        </p:nvSpPr>
+        <p:spPr>
+          <a:xfrm>
+            <a:off x="5466588" y="4228592"/>
+            <a:ext cx="116839" cy="299720"/>
+          </a:xfrm>
+          <a:prstGeom prst="rect">
+            <a:avLst/>
+          </a:prstGeom>
+        </p:spPr>
+        <p:txBody>
+          <a:bodyPr vert="horz" wrap="square" lIns="0" tIns="12700" rIns="0" bIns="0" rtlCol="0">
+            <a:spAutoFit/>
+          </a:bodyPr>
+          <a:lstStyle/>
+          <a:p>
+            <a:pPr marL="12700">
+              <a:lnSpc>
+                <a:spcPct val="100000"/>
+              </a:lnSpc>
+              <a:spcBef>
+                <a:spcPts val="100"/>
+              </a:spcBef>
+            </a:pPr>
+            <a:r>
+              <a:rPr sz="1800" dirty="0">
+                <a:solidFill>
+                  <a:srgbClr val="EF5A28"/>
+                </a:solidFill>
+                <a:latin typeface="Segoe UI" panose="020B0502040204020203"/>
+                <a:cs typeface="Segoe UI" panose="020B0502040204020203"/>
+              </a:rPr>
+              <a:t>-</a:t>
+            </a:r>
+            <a:endParaRPr sz="1800">
+              <a:latin typeface="Segoe UI" panose="020B0502040204020203"/>
+              <a:cs typeface="Segoe UI" panose="020B0502040204020203"/>
+            </a:endParaRPr>
+          </a:p>
+        </p:txBody>
+      </p:sp>
       <p:pic>
         <p:nvPicPr>
-          <p:cNvPr id="17" name="object 17"/>
+          <p:cNvPr id="16" name="object 16"/>
           <p:cNvPicPr/>
           <p:nvPr/>
         </p:nvPicPr>
@@ -3122,87 +3171,17 @@
         </p:blipFill>
         <p:spPr>
           <a:xfrm>
-            <a:off x="5239003" y="4771644"/>
-            <a:ext cx="3075051" cy="365760"/>
+            <a:off x="5768085" y="4177284"/>
+            <a:ext cx="3004439" cy="365760"/>
           </a:xfrm>
           <a:prstGeom prst="rect">
             <a:avLst/>
           </a:prstGeom>
         </p:spPr>
       </p:pic>
-      <p:sp>
-        <p:nvSpPr>
-          <p:cNvPr id="18" name="object 18"/>
-          <p:cNvSpPr txBox="1"/>
-          <p:nvPr/>
-        </p:nvSpPr>
-        <p:spPr>
-          <a:xfrm>
-            <a:off x="5466588" y="5264911"/>
-            <a:ext cx="116839" cy="742315"/>
-          </a:xfrm>
-          <a:prstGeom prst="rect">
-            <a:avLst/>
-          </a:prstGeom>
-        </p:spPr>
-        <p:txBody>
-          <a:bodyPr vert="horz" wrap="square" lIns="0" tIns="12700" rIns="0" bIns="0" rtlCol="0">
-            <a:spAutoFit/>
-          </a:bodyPr>
-          <a:lstStyle/>
-          <a:p>
-            <a:pPr marL="12700">
-              <a:lnSpc>
-                <a:spcPct val="100000"/>
-              </a:lnSpc>
-              <a:spcBef>
-                <a:spcPts val="100"/>
-              </a:spcBef>
-            </a:pPr>
-            <a:r>
-              <a:rPr sz="1800" dirty="0">
-                <a:solidFill>
-                  <a:srgbClr val="EF5A28"/>
-                </a:solidFill>
-                <a:latin typeface="Segoe UI" panose="020B0502040204020203"/>
-                <a:cs typeface="Segoe UI" panose="020B0502040204020203"/>
-              </a:rPr>
-              <a:t>-</a:t>
-            </a:r>
-            <a:endParaRPr sz="1800">
-              <a:latin typeface="Segoe UI" panose="020B0502040204020203"/>
-              <a:cs typeface="Segoe UI" panose="020B0502040204020203"/>
-            </a:endParaRPr>
-          </a:p>
-          <a:p>
-            <a:pPr marL="12700">
-              <a:lnSpc>
-                <a:spcPct val="100000"/>
-              </a:lnSpc>
-              <a:spcBef>
-                <a:spcPts val="1320"/>
-              </a:spcBef>
-            </a:pPr>
-            <a:r>
-              <a:rPr sz="1800" dirty="0">
-                <a:solidFill>
-                  <a:srgbClr val="EF5A28"/>
-                </a:solidFill>
-                <a:latin typeface="Segoe UI" panose="020B0502040204020203"/>
-                <a:cs typeface="Segoe UI" panose="020B0502040204020203"/>
-              </a:rPr>
-              <a:t>-</a:t>
-            </a:r>
-            <a:endParaRPr sz="1800">
-              <a:latin typeface="Segoe UI" panose="020B0502040204020203"/>
-              <a:cs typeface="Segoe UI" panose="020B0502040204020203"/>
-            </a:endParaRPr>
-          </a:p>
-        </p:txBody>
-      </p:sp>
       <p:pic>
         <p:nvPicPr>
-          <p:cNvPr id="19" name="object 19"/>
+          <p:cNvPr id="17" name="object 17"/>
           <p:cNvPicPr/>
           <p:nvPr/>
         </p:nvPicPr>
@@ -3214,17 +3193,87 @@
         </p:blipFill>
         <p:spPr>
           <a:xfrm>
-            <a:off x="5768085" y="5213350"/>
-            <a:ext cx="3534917" cy="366013"/>
+            <a:off x="5239003" y="4771644"/>
+            <a:ext cx="3075051" cy="365760"/>
           </a:xfrm>
           <a:prstGeom prst="rect">
             <a:avLst/>
           </a:prstGeom>
         </p:spPr>
       </p:pic>
+      <p:sp>
+        <p:nvSpPr>
+          <p:cNvPr id="18" name="object 18"/>
+          <p:cNvSpPr txBox="1"/>
+          <p:nvPr/>
+        </p:nvSpPr>
+        <p:spPr>
+          <a:xfrm>
+            <a:off x="5466588" y="5264911"/>
+            <a:ext cx="116839" cy="742315"/>
+          </a:xfrm>
+          <a:prstGeom prst="rect">
+            <a:avLst/>
+          </a:prstGeom>
+        </p:spPr>
+        <p:txBody>
+          <a:bodyPr vert="horz" wrap="square" lIns="0" tIns="12700" rIns="0" bIns="0" rtlCol="0">
+            <a:spAutoFit/>
+          </a:bodyPr>
+          <a:lstStyle/>
+          <a:p>
+            <a:pPr marL="12700">
+              <a:lnSpc>
+                <a:spcPct val="100000"/>
+              </a:lnSpc>
+              <a:spcBef>
+                <a:spcPts val="100"/>
+              </a:spcBef>
+            </a:pPr>
+            <a:r>
+              <a:rPr sz="1800" dirty="0">
+                <a:solidFill>
+                  <a:srgbClr val="EF5A28"/>
+                </a:solidFill>
+                <a:latin typeface="Segoe UI" panose="020B0502040204020203"/>
+                <a:cs typeface="Segoe UI" panose="020B0502040204020203"/>
+              </a:rPr>
+              <a:t>-</a:t>
+            </a:r>
+            <a:endParaRPr sz="1800">
+              <a:latin typeface="Segoe UI" panose="020B0502040204020203"/>
+              <a:cs typeface="Segoe UI" panose="020B0502040204020203"/>
+            </a:endParaRPr>
+          </a:p>
+          <a:p>
+            <a:pPr marL="12700">
+              <a:lnSpc>
+                <a:spcPct val="100000"/>
+              </a:lnSpc>
+              <a:spcBef>
+                <a:spcPts val="1320"/>
+              </a:spcBef>
+            </a:pPr>
+            <a:r>
+              <a:rPr sz="1800" dirty="0">
+                <a:solidFill>
+                  <a:srgbClr val="EF5A28"/>
+                </a:solidFill>
+                <a:latin typeface="Segoe UI" panose="020B0502040204020203"/>
+                <a:cs typeface="Segoe UI" panose="020B0502040204020203"/>
+              </a:rPr>
+              <a:t>-</a:t>
+            </a:r>
+            <a:endParaRPr sz="1800">
+              <a:latin typeface="Segoe UI" panose="020B0502040204020203"/>
+              <a:cs typeface="Segoe UI" panose="020B0502040204020203"/>
+            </a:endParaRPr>
+          </a:p>
+        </p:txBody>
+      </p:sp>
       <p:pic>
         <p:nvPicPr>
-          <p:cNvPr id="20" name="object 20"/>
+          <p:cNvPr id="19" name="object 19"/>
           <p:cNvPicPr/>
           <p:nvPr/>
         </p:nvPicPr>
@@ -3236,8 +3285,8 @@
         </p:blipFill>
         <p:spPr>
           <a:xfrm>
-            <a:off x="5768085" y="5655817"/>
-            <a:ext cx="4284091" cy="365759"/>
+            <a:off x="5768085" y="5213350"/>
+            <a:ext cx="3534917" cy="366013"/>
           </a:xfrm>
           <a:prstGeom prst="rect">
             <a:avLst/>
@@ -3246,7 +3295,7 @@
       </p:pic>
       <p:pic>
         <p:nvPicPr>
-          <p:cNvPr id="21" name="object 21"/>
+          <p:cNvPr id="20" name="object 20"/>
           <p:cNvPicPr/>
           <p:nvPr/>
         </p:nvPicPr>
@@ -3258,6 +3307,28 @@
         </p:blipFill>
         <p:spPr>
           <a:xfrm>
+            <a:off x="5768085" y="5655817"/>
+            <a:ext cx="4284091" cy="365759"/>
+          </a:xfrm>
+          <a:prstGeom prst="rect">
+            <a:avLst/>
+          </a:prstGeom>
+        </p:spPr>
+      </p:pic>
+      <p:pic>
+        <p:nvPicPr>
+          <p:cNvPr id="21" name="object 21"/>
+          <p:cNvPicPr/>
+          <p:nvPr/>
+        </p:nvPicPr>
+        <p:blipFill>
+          <a:blip r:embed="rId16" cstate="print"/>
+          <a:stretch>
+            <a:fillRect/>
+          </a:stretch>
+        </p:blipFill>
+        <p:spPr>
+          <a:xfrm>
             <a:off x="1239266" y="1947672"/>
             <a:ext cx="2465451" cy="548639"/>
           </a:xfrm>
@@ -3279,9 +3350,11 @@
         <p:spPr/>
         <p:txBody>
           <a:bodyPr/>
+          <a:lstStyle/>
           <a:p>
             <a:fld id="{B6F15528-21DE-4FAA-801E-634DDDAF4B2B}" type="slidenum">
               <a:rPr/>
+              <a:t>15</a:t>
             </a:fld>
             <a:endParaRPr/>
           </a:p>
@@ -3319,28 +3392,6 @@
           <p:nvPr/>
         </p:nvPicPr>
         <p:blipFill>
-          <a:blip r:embed="rId1" cstate="print"/>
-          <a:stretch>
-            <a:fillRect/>
-          </a:stretch>
-        </p:blipFill>
-        <p:spPr>
-          <a:xfrm>
-            <a:off x="0" y="0"/>
-            <a:ext cx="4635246" cy="6858000"/>
-          </a:xfrm>
-          <a:prstGeom prst="rect">
-            <a:avLst/>
-          </a:prstGeom>
-        </p:spPr>
-      </p:pic>
-      <p:pic>
-        <p:nvPicPr>
-          <p:cNvPr id="3" name="object 3"/>
-          <p:cNvPicPr/>
-          <p:nvPr/>
-        </p:nvPicPr>
-        <p:blipFill>
           <a:blip r:embed="rId2" cstate="print"/>
           <a:stretch>
             <a:fillRect/>
@@ -3348,8 +3399,8 @@
         </p:blipFill>
         <p:spPr>
           <a:xfrm>
-            <a:off x="5239003" y="1654810"/>
-            <a:ext cx="5287136" cy="365760"/>
+            <a:off x="0" y="0"/>
+            <a:ext cx="4635246" cy="6858000"/>
           </a:xfrm>
           <a:prstGeom prst="rect">
             <a:avLst/>
@@ -3358,7 +3409,7 @@
       </p:pic>
       <p:pic>
         <p:nvPicPr>
-          <p:cNvPr id="4" name="object 4"/>
+          <p:cNvPr id="3" name="object 3"/>
           <p:cNvPicPr/>
           <p:nvPr/>
         </p:nvPicPr>
@@ -3370,8 +3421,8 @@
         </p:blipFill>
         <p:spPr>
           <a:xfrm>
-            <a:off x="5239003" y="2249170"/>
-            <a:ext cx="3882644" cy="365760"/>
+            <a:off x="5239003" y="1654810"/>
+            <a:ext cx="5287136" cy="365760"/>
           </a:xfrm>
           <a:prstGeom prst="rect">
             <a:avLst/>
@@ -3380,7 +3431,7 @@
       </p:pic>
       <p:pic>
         <p:nvPicPr>
-          <p:cNvPr id="5" name="object 5"/>
+          <p:cNvPr id="4" name="object 4"/>
           <p:cNvPicPr/>
           <p:nvPr/>
         </p:nvPicPr>
@@ -3392,8 +3443,8 @@
         </p:blipFill>
         <p:spPr>
           <a:xfrm>
-            <a:off x="5239003" y="2843783"/>
-            <a:ext cx="2797175" cy="365760"/>
+            <a:off x="5239003" y="2249170"/>
+            <a:ext cx="3882644" cy="365760"/>
           </a:xfrm>
           <a:prstGeom prst="rect">
             <a:avLst/>
@@ -3402,7 +3453,7 @@
       </p:pic>
       <p:pic>
         <p:nvPicPr>
-          <p:cNvPr id="6" name="object 6"/>
+          <p:cNvPr id="5" name="object 5"/>
           <p:cNvPicPr/>
           <p:nvPr/>
         </p:nvPicPr>
@@ -3414,8 +3465,8 @@
         </p:blipFill>
         <p:spPr>
           <a:xfrm>
-            <a:off x="5239003" y="3438144"/>
-            <a:ext cx="4388611" cy="365759"/>
+            <a:off x="5239003" y="2843783"/>
+            <a:ext cx="2797175" cy="365760"/>
           </a:xfrm>
           <a:prstGeom prst="rect">
             <a:avLst/>
@@ -3424,7 +3475,7 @@
       </p:pic>
       <p:pic>
         <p:nvPicPr>
-          <p:cNvPr id="7" name="object 7"/>
+          <p:cNvPr id="6" name="object 6"/>
           <p:cNvPicPr/>
           <p:nvPr/>
         </p:nvPicPr>
@@ -3436,8 +3487,8 @@
         </p:blipFill>
         <p:spPr>
           <a:xfrm>
-            <a:off x="5239003" y="4032503"/>
-            <a:ext cx="2579751" cy="365760"/>
+            <a:off x="5239003" y="3438144"/>
+            <a:ext cx="4388611" cy="365759"/>
           </a:xfrm>
           <a:prstGeom prst="rect">
             <a:avLst/>
@@ -3446,7 +3497,7 @@
       </p:pic>
       <p:pic>
         <p:nvPicPr>
-          <p:cNvPr id="8" name="object 8"/>
+          <p:cNvPr id="7" name="object 7"/>
           <p:cNvPicPr/>
           <p:nvPr/>
         </p:nvPicPr>
@@ -3458,8 +3509,8 @@
         </p:blipFill>
         <p:spPr>
           <a:xfrm>
-            <a:off x="5239003" y="4626864"/>
-            <a:ext cx="3075051" cy="365760"/>
+            <a:off x="5239003" y="4032503"/>
+            <a:ext cx="2579751" cy="365760"/>
           </a:xfrm>
           <a:prstGeom prst="rect">
             <a:avLst/>
@@ -3468,7 +3519,7 @@
       </p:pic>
       <p:pic>
         <p:nvPicPr>
-          <p:cNvPr id="9" name="object 9"/>
+          <p:cNvPr id="8" name="object 8"/>
           <p:cNvPicPr/>
           <p:nvPr/>
         </p:nvPicPr>
@@ -3480,6 +3531,28 @@
         </p:blipFill>
         <p:spPr>
           <a:xfrm>
+            <a:off x="5239003" y="4626864"/>
+            <a:ext cx="3075051" cy="365760"/>
+          </a:xfrm>
+          <a:prstGeom prst="rect">
+            <a:avLst/>
+          </a:prstGeom>
+        </p:spPr>
+      </p:pic>
+      <p:pic>
+        <p:nvPicPr>
+          <p:cNvPr id="9" name="object 9"/>
+          <p:cNvPicPr/>
+          <p:nvPr/>
+        </p:nvPicPr>
+        <p:blipFill>
+          <a:blip r:embed="rId9" cstate="print"/>
+          <a:stretch>
+            <a:fillRect/>
+          </a:stretch>
+        </p:blipFill>
+        <p:spPr>
+          <a:xfrm>
             <a:off x="935227" y="1947672"/>
             <a:ext cx="2995676" cy="548639"/>
           </a:xfrm>
@@ -3501,9 +3574,11 @@
         <p:spPr/>
         <p:txBody>
           <a:bodyPr/>
+          <a:lstStyle/>
           <a:p>
             <a:fld id="{B6F15528-21DE-4FAA-801E-634DDDAF4B2B}" type="slidenum">
               <a:rPr/>
+              <a:t>2</a:t>
             </a:fld>
             <a:endParaRPr/>
           </a:p>
@@ -3541,7 +3616,7 @@
           <p:nvPr/>
         </p:nvPicPr>
         <p:blipFill>
-          <a:blip r:embed="rId1" cstate="print"/>
+          <a:blip r:embed="rId2" cstate="print"/>
           <a:stretch>
             <a:fillRect/>
           </a:stretch>
@@ -3563,7 +3638,7 @@
           <p:nvPr/>
         </p:nvPicPr>
         <p:blipFill>
-          <a:blip r:embed="rId2" cstate="print"/>
+          <a:blip r:embed="rId3" cstate="print"/>
           <a:stretch>
             <a:fillRect/>
           </a:stretch>
@@ -3591,9 +3666,11 @@
         <p:spPr/>
         <p:txBody>
           <a:bodyPr/>
+          <a:lstStyle/>
           <a:p>
             <a:fld id="{B6F15528-21DE-4FAA-801E-634DDDAF4B2B}" type="slidenum">
               <a:rPr/>
+              <a:t>3</a:t>
             </a:fld>
             <a:endParaRPr/>
           </a:p>
@@ -3669,7 +3746,9 @@
         <p:txBody>
           <a:bodyPr wrap="square" lIns="0" tIns="0" rIns="0" bIns="0" rtlCol="0"/>
           <a:lstStyle/>
-          <a:p/>
+          <a:p>
+            <a:endParaRPr/>
+          </a:p>
         </p:txBody>
       </p:sp>
       <p:sp>
@@ -3941,7 +4020,7 @@
           <p:nvPr/>
         </p:nvPicPr>
         <p:blipFill>
-          <a:blip r:embed="rId1" cstate="print"/>
+          <a:blip r:embed="rId2" cstate="print"/>
           <a:stretch>
             <a:fillRect/>
           </a:stretch>
@@ -3969,9 +4048,11 @@
         <p:spPr/>
         <p:txBody>
           <a:bodyPr/>
+          <a:lstStyle/>
           <a:p>
             <a:fld id="{B6F15528-21DE-4FAA-801E-634DDDAF4B2B}" type="slidenum">
               <a:rPr/>
+              <a:t>4</a:t>
             </a:fld>
             <a:endParaRPr/>
           </a:p>
@@ -4009,7 +4090,7 @@
           <p:nvPr/>
         </p:nvPicPr>
         <p:blipFill>
-          <a:blip r:embed="rId1" cstate="print"/>
+          <a:blip r:embed="rId2" cstate="print"/>
           <a:stretch>
             <a:fillRect/>
           </a:stretch>
@@ -4031,7 +4112,7 @@
           <p:nvPr/>
         </p:nvPicPr>
         <p:blipFill>
-          <a:blip r:embed="rId2" cstate="print"/>
+          <a:blip r:embed="rId3" cstate="print"/>
           <a:stretch>
             <a:fillRect/>
           </a:stretch>
@@ -4059,9 +4140,11 @@
         <p:spPr/>
         <p:txBody>
           <a:bodyPr/>
+          <a:lstStyle/>
           <a:p>
             <a:fld id="{B6F15528-21DE-4FAA-801E-634DDDAF4B2B}" type="slidenum">
               <a:rPr/>
+              <a:t>5</a:t>
             </a:fld>
             <a:endParaRPr/>
           </a:p>
@@ -4137,7 +4220,9 @@
         <p:txBody>
           <a:bodyPr wrap="square" lIns="0" tIns="0" rIns="0" bIns="0" rtlCol="0"/>
           <a:lstStyle/>
-          <a:p/>
+          <a:p>
+            <a:endParaRPr/>
+          </a:p>
         </p:txBody>
       </p:sp>
       <p:sp>
@@ -4179,7 +4264,7 @@
               </a:rPr>
               <a:t>…</a:t>
             </a:r>
-            <a:endParaRPr sz="2400">
+            <a:endParaRPr sz="2400" dirty="0">
               <a:latin typeface="Courier New" panose="02070309020205020404"/>
               <a:cs typeface="Courier New" panose="02070309020205020404"/>
             </a:endParaRPr>
@@ -4283,7 +4368,7 @@
               </a:rPr>
               <a:t>&gt;</a:t>
             </a:r>
-            <a:endParaRPr sz="2400">
+            <a:endParaRPr sz="2400" dirty="0">
               <a:latin typeface="Courier New" panose="02070309020205020404"/>
               <a:cs typeface="Courier New" panose="02070309020205020404"/>
             </a:endParaRPr>
@@ -4307,7 +4392,7 @@
               </a:rPr>
               <a:t>…</a:t>
             </a:r>
-            <a:endParaRPr sz="2400">
+            <a:endParaRPr sz="2400" dirty="0">
               <a:latin typeface="Courier New" panose="02070309020205020404"/>
               <a:cs typeface="Courier New" panose="02070309020205020404"/>
             </a:endParaRPr>
@@ -4321,7 +4406,7 @@
           <p:nvPr/>
         </p:nvPicPr>
         <p:blipFill>
-          <a:blip r:embed="rId1" cstate="print"/>
+          <a:blip r:embed="rId2" cstate="print"/>
           <a:stretch>
             <a:fillRect/>
           </a:stretch>
@@ -4349,9 +4434,11 @@
         <p:spPr/>
         <p:txBody>
           <a:bodyPr/>
+          <a:lstStyle/>
           <a:p>
             <a:fld id="{B6F15528-21DE-4FAA-801E-634DDDAF4B2B}" type="slidenum">
               <a:rPr/>
+              <a:t>6</a:t>
             </a:fld>
             <a:endParaRPr/>
           </a:p>
@@ -4427,7 +4514,9 @@
         <p:txBody>
           <a:bodyPr wrap="square" lIns="0" tIns="0" rIns="0" bIns="0" rtlCol="0"/>
           <a:lstStyle/>
-          <a:p/>
+          <a:p>
+            <a:endParaRPr/>
+          </a:p>
         </p:txBody>
       </p:sp>
       <p:sp>
@@ -4515,7 +4604,7 @@
               </a:rPr>
               <a:t>…</a:t>
             </a:r>
-            <a:endParaRPr sz="2400">
+            <a:endParaRPr sz="2400" dirty="0">
               <a:latin typeface="Courier New" panose="02070309020205020404"/>
               <a:cs typeface="Courier New" panose="02070309020205020404"/>
             </a:endParaRPr>
@@ -4609,7 +4698,7 @@
               </a:rPr>
               <a:t>/&gt;</a:t>
             </a:r>
-            <a:endParaRPr sz="2400">
+            <a:endParaRPr sz="2400" dirty="0">
               <a:latin typeface="Courier New" panose="02070309020205020404"/>
               <a:cs typeface="Courier New" panose="02070309020205020404"/>
             </a:endParaRPr>
@@ -4633,7 +4722,7 @@
               </a:rPr>
               <a:t>…</a:t>
             </a:r>
-            <a:endParaRPr sz="2400">
+            <a:endParaRPr sz="2400" dirty="0">
               <a:latin typeface="Courier New" panose="02070309020205020404"/>
               <a:cs typeface="Courier New" panose="02070309020205020404"/>
             </a:endParaRPr>
@@ -4647,7 +4736,7 @@
           <p:nvPr/>
         </p:nvPicPr>
         <p:blipFill>
-          <a:blip r:embed="rId1" cstate="print"/>
+          <a:blip r:embed="rId2" cstate="print"/>
           <a:stretch>
             <a:fillRect/>
           </a:stretch>
@@ -4675,9 +4764,11 @@
         <p:spPr/>
         <p:txBody>
           <a:bodyPr/>
+          <a:lstStyle/>
           <a:p>
             <a:fld id="{B6F15528-21DE-4FAA-801E-634DDDAF4B2B}" type="slidenum">
               <a:rPr/>
+              <a:t>7</a:t>
             </a:fld>
             <a:endParaRPr/>
           </a:p>
@@ -4716,7 +4807,7 @@
         </p:nvSpPr>
         <p:spPr>
           <a:xfrm>
-            <a:off x="0" y="0"/>
+            <a:off x="0" y="-137160"/>
             <a:ext cx="12192000" cy="6858000"/>
           </a:xfrm>
           <a:custGeom>
@@ -4753,7 +4844,9 @@
         <p:txBody>
           <a:bodyPr wrap="square" lIns="0" tIns="0" rIns="0" bIns="0" rtlCol="0"/>
           <a:lstStyle/>
-          <a:p/>
+          <a:p>
+            <a:endParaRPr/>
+          </a:p>
         </p:txBody>
       </p:sp>
       <p:sp>
@@ -4795,7 +4888,7 @@
               </a:rPr>
               <a:t>…</a:t>
             </a:r>
-            <a:endParaRPr sz="2400">
+            <a:endParaRPr sz="2400" dirty="0">
               <a:latin typeface="Courier New" panose="02070309020205020404"/>
               <a:cs typeface="Courier New" panose="02070309020205020404"/>
             </a:endParaRPr>
@@ -4899,7 +4992,7 @@
               </a:rPr>
               <a:t>&gt;</a:t>
             </a:r>
-            <a:endParaRPr sz="2400">
+            <a:endParaRPr sz="2400" dirty="0">
               <a:latin typeface="Courier New" panose="02070309020205020404"/>
               <a:cs typeface="Courier New" panose="02070309020205020404"/>
             </a:endParaRPr>
@@ -4923,7 +5016,7 @@
               </a:rPr>
               <a:t>…</a:t>
             </a:r>
-            <a:endParaRPr sz="2400">
+            <a:endParaRPr sz="2400" dirty="0">
               <a:latin typeface="Courier New" panose="02070309020205020404"/>
               <a:cs typeface="Courier New" panose="02070309020205020404"/>
             </a:endParaRPr>
@@ -4937,7 +5030,7 @@
           <p:nvPr/>
         </p:nvPicPr>
         <p:blipFill>
-          <a:blip r:embed="rId1" cstate="print"/>
+          <a:blip r:embed="rId2" cstate="print"/>
           <a:stretch>
             <a:fillRect/>
           </a:stretch>
@@ -4965,9 +5058,11 @@
         <p:spPr/>
         <p:txBody>
           <a:bodyPr/>
+          <a:lstStyle/>
           <a:p>
             <a:fld id="{B6F15528-21DE-4FAA-801E-634DDDAF4B2B}" type="slidenum">
               <a:rPr/>
+              <a:t>8</a:t>
             </a:fld>
             <a:endParaRPr/>
           </a:p>
@@ -5005,7 +5100,7 @@
           <p:nvPr/>
         </p:nvPicPr>
         <p:blipFill>
-          <a:blip r:embed="rId1" cstate="print"/>
+          <a:blip r:embed="rId2" cstate="print"/>
           <a:stretch>
             <a:fillRect/>
           </a:stretch>
@@ -5027,7 +5122,7 @@
           <p:nvPr/>
         </p:nvPicPr>
         <p:blipFill>
-          <a:blip r:embed="rId2" cstate="print"/>
+          <a:blip r:embed="rId3" cstate="print"/>
           <a:stretch>
             <a:fillRect/>
           </a:stretch>
@@ -5055,9 +5150,11 @@
         <p:spPr/>
         <p:txBody>
           <a:bodyPr/>
+          <a:lstStyle/>
           <a:p>
             <a:fld id="{B6F15528-21DE-4FAA-801E-634DDDAF4B2B}" type="slidenum">
               <a:rPr/>
+              <a:t>9</a:t>
             </a:fld>
             <a:endParaRPr/>
           </a:p>
@@ -5349,6 +5446,8 @@
       </a:bgFillStyleLst>
     </a:fmtScheme>
   </a:themeElements>
+  <a:objectDefaults/>
+  <a:extraClrSchemeLst/>
   <a:extLst>
     <a:ext uri="{05A4C25C-085E-4340-85A3-A5531E510DB2}">
       <thm15:themeFamily xmlns:thm15="http://schemas.microsoft.com/office/thememl/2012/main" name="Office Theme" id="{62F939B6-93AF-4DB8-9C6B-D6C7DFDC589F}" vid="{4A3C46E8-61CC-4603-A589-7422A47A8E4A}"/>
@@ -5608,6 +5707,8 @@
       </a:bgFillStyleLst>
     </a:fmtScheme>
   </a:themeElements>
+  <a:objectDefaults/>
+  <a:extraClrSchemeLst/>
   <a:extLst>
     <a:ext uri="{05A4C25C-085E-4340-85A3-A5531E510DB2}">
       <thm15:themeFamily xmlns:thm15="http://schemas.microsoft.com/office/thememl/2012/main" name="Office Theme" id="{62F939B6-93AF-4DB8-9C6B-D6C7DFDC589F}" vid="{4A3C46E8-61CC-4603-A589-7422A47A8E4A}"/>

</xml_diff>